<commit_message>
add the p-value distribution
</commit_message>
<xml_diff>
--- a/COSADE-2020/COSADE-2020.pptx
+++ b/COSADE-2020/COSADE-2020.pptx
@@ -8,6 +8,7 @@
     <p:sldId id="256" r:id="rId2"/>
     <p:sldId id="257" r:id="rId3"/>
     <p:sldId id="258" r:id="rId4"/>
+    <p:sldId id="259" r:id="rId5"/>
   </p:sldIdLst>
   <p:sldSz cx="18288000" cy="8686800"/>
   <p:notesSz cx="6858000" cy="9144000"/>
@@ -245,7 +246,7 @@
           <a:p>
             <a:fld id="{732678D5-7B64-43B5-B53F-D8463588D480}" type="datetimeFigureOut">
               <a:rPr lang="en-US" smtClean="0"/>
-              <a:t>11/4/2019</a:t>
+              <a:t>11/7/2019</a:t>
             </a:fld>
             <a:endParaRPr lang="en-US"/>
           </a:p>
@@ -415,7 +416,7 @@
           <a:p>
             <a:fld id="{732678D5-7B64-43B5-B53F-D8463588D480}" type="datetimeFigureOut">
               <a:rPr lang="en-US" smtClean="0"/>
-              <a:t>11/4/2019</a:t>
+              <a:t>11/7/2019</a:t>
             </a:fld>
             <a:endParaRPr lang="en-US"/>
           </a:p>
@@ -595,7 +596,7 @@
           <a:p>
             <a:fld id="{732678D5-7B64-43B5-B53F-D8463588D480}" type="datetimeFigureOut">
               <a:rPr lang="en-US" smtClean="0"/>
-              <a:t>11/4/2019</a:t>
+              <a:t>11/7/2019</a:t>
             </a:fld>
             <a:endParaRPr lang="en-US"/>
           </a:p>
@@ -765,7 +766,7 @@
           <a:p>
             <a:fld id="{732678D5-7B64-43B5-B53F-D8463588D480}" type="datetimeFigureOut">
               <a:rPr lang="en-US" smtClean="0"/>
-              <a:t>11/4/2019</a:t>
+              <a:t>11/7/2019</a:t>
             </a:fld>
             <a:endParaRPr lang="en-US"/>
           </a:p>
@@ -1011,7 +1012,7 @@
           <a:p>
             <a:fld id="{732678D5-7B64-43B5-B53F-D8463588D480}" type="datetimeFigureOut">
               <a:rPr lang="en-US" smtClean="0"/>
-              <a:t>11/4/2019</a:t>
+              <a:t>11/7/2019</a:t>
             </a:fld>
             <a:endParaRPr lang="en-US"/>
           </a:p>
@@ -1243,7 +1244,7 @@
           <a:p>
             <a:fld id="{732678D5-7B64-43B5-B53F-D8463588D480}" type="datetimeFigureOut">
               <a:rPr lang="en-US" smtClean="0"/>
-              <a:t>11/4/2019</a:t>
+              <a:t>11/7/2019</a:t>
             </a:fld>
             <a:endParaRPr lang="en-US"/>
           </a:p>
@@ -1610,7 +1611,7 @@
           <a:p>
             <a:fld id="{732678D5-7B64-43B5-B53F-D8463588D480}" type="datetimeFigureOut">
               <a:rPr lang="en-US" smtClean="0"/>
-              <a:t>11/4/2019</a:t>
+              <a:t>11/7/2019</a:t>
             </a:fld>
             <a:endParaRPr lang="en-US"/>
           </a:p>
@@ -1728,7 +1729,7 @@
           <a:p>
             <a:fld id="{732678D5-7B64-43B5-B53F-D8463588D480}" type="datetimeFigureOut">
               <a:rPr lang="en-US" smtClean="0"/>
-              <a:t>11/4/2019</a:t>
+              <a:t>11/7/2019</a:t>
             </a:fld>
             <a:endParaRPr lang="en-US"/>
           </a:p>
@@ -1823,7 +1824,7 @@
           <a:p>
             <a:fld id="{732678D5-7B64-43B5-B53F-D8463588D480}" type="datetimeFigureOut">
               <a:rPr lang="en-US" smtClean="0"/>
-              <a:t>11/4/2019</a:t>
+              <a:t>11/7/2019</a:t>
             </a:fld>
             <a:endParaRPr lang="en-US"/>
           </a:p>
@@ -2100,7 +2101,7 @@
           <a:p>
             <a:fld id="{732678D5-7B64-43B5-B53F-D8463588D480}" type="datetimeFigureOut">
               <a:rPr lang="en-US" smtClean="0"/>
-              <a:t>11/4/2019</a:t>
+              <a:t>11/7/2019</a:t>
             </a:fld>
             <a:endParaRPr lang="en-US"/>
           </a:p>
@@ -2357,7 +2358,7 @@
           <a:p>
             <a:fld id="{732678D5-7B64-43B5-B53F-D8463588D480}" type="datetimeFigureOut">
               <a:rPr lang="en-US" smtClean="0"/>
-              <a:t>11/4/2019</a:t>
+              <a:t>11/7/2019</a:t>
             </a:fld>
             <a:endParaRPr lang="en-US"/>
           </a:p>
@@ -2570,7 +2571,7 @@
           <a:p>
             <a:fld id="{732678D5-7B64-43B5-B53F-D8463588D480}" type="datetimeFigureOut">
               <a:rPr lang="en-US" smtClean="0"/>
-              <a:t>11/4/2019</a:t>
+              <a:t>11/7/2019</a:t>
             </a:fld>
             <a:endParaRPr lang="en-US"/>
           </a:p>
@@ -3072,11 +3073,6 @@
               </a:rPr>
               <a:t>D</a:t>
             </a:r>
-            <a:endParaRPr lang="en-US" sz="2400" b="1" dirty="0">
-              <a:solidFill>
-                <a:srgbClr val="C00000"/>
-              </a:solidFill>
-            </a:endParaRPr>
           </a:p>
         </p:txBody>
       </p:sp>
@@ -4777,8 +4773,8 @@
                 </a:p>
               </p:txBody>
             </p:sp>
-            <mc:AlternateContent xmlns:mc="http://schemas.openxmlformats.org/markup-compatibility/2006">
-              <mc:Choice xmlns:a14="http://schemas.microsoft.com/office/drawing/2010/main" Requires="a14">
+            <mc:AlternateContent xmlns:mc="http://schemas.openxmlformats.org/markup-compatibility/2006" xmlns:a14="http://schemas.microsoft.com/office/drawing/2010/main">
+              <mc:Choice Requires="a14">
                 <p:sp>
                   <p:nvSpPr>
                     <p:cNvPr id="56" name="Rectangle 51"/>
@@ -4995,7 +4991,7 @@
                   </p:txBody>
                 </p:sp>
               </mc:Choice>
-              <mc:Fallback>
+              <mc:Fallback xmlns="">
                 <p:sp>
                   <p:nvSpPr>
                     <p:cNvPr id="56" name="Rectangle 51"/>
@@ -5419,8 +5415,8 @@
               </p:txBody>
             </p:sp>
           </p:grpSp>
-          <mc:AlternateContent xmlns:mc="http://schemas.openxmlformats.org/markup-compatibility/2006">
-            <mc:Choice xmlns:a14="http://schemas.microsoft.com/office/drawing/2010/main" Requires="a14">
+          <mc:AlternateContent xmlns:mc="http://schemas.openxmlformats.org/markup-compatibility/2006" xmlns:a14="http://schemas.microsoft.com/office/drawing/2010/main">
+            <mc:Choice Requires="a14">
               <p:sp>
                 <p:nvSpPr>
                   <p:cNvPr id="59" name="Rectangle 51"/>
@@ -5637,7 +5633,7 @@
                 </p:txBody>
               </p:sp>
             </mc:Choice>
-            <mc:Fallback>
+            <mc:Fallback xmlns="">
               <p:sp>
                 <p:nvSpPr>
                   <p:cNvPr id="59" name="Rectangle 51"/>
@@ -5698,8 +5694,8 @@
               </p:sp>
             </mc:Fallback>
           </mc:AlternateContent>
-          <mc:AlternateContent xmlns:mc="http://schemas.openxmlformats.org/markup-compatibility/2006">
-            <mc:Choice xmlns:a14="http://schemas.microsoft.com/office/drawing/2010/main" Requires="a14">
+          <mc:AlternateContent xmlns:mc="http://schemas.openxmlformats.org/markup-compatibility/2006" xmlns:a14="http://schemas.microsoft.com/office/drawing/2010/main">
+            <mc:Choice Requires="a14">
               <p:sp>
                 <p:nvSpPr>
                   <p:cNvPr id="60" name="Rectangle 51"/>
@@ -5916,7 +5912,7 @@
                 </p:txBody>
               </p:sp>
             </mc:Choice>
-            <mc:Fallback>
+            <mc:Fallback xmlns="">
               <p:sp>
                 <p:nvSpPr>
                   <p:cNvPr id="60" name="Rectangle 51"/>
@@ -6016,8 +6012,8 @@
               </a:prstGeom>
             </p:spPr>
           </p:pic>
-          <mc:AlternateContent xmlns:mc="http://schemas.openxmlformats.org/markup-compatibility/2006">
-            <mc:Choice xmlns:a14="http://schemas.microsoft.com/office/drawing/2010/main" Requires="a14">
+          <mc:AlternateContent xmlns:mc="http://schemas.openxmlformats.org/markup-compatibility/2006" xmlns:a14="http://schemas.microsoft.com/office/drawing/2010/main">
+            <mc:Choice Requires="a14">
               <p:sp>
                 <p:nvSpPr>
                   <p:cNvPr id="89" name="Rectangle 51"/>
@@ -6234,7 +6230,7 @@
                 </p:txBody>
               </p:sp>
             </mc:Choice>
-            <mc:Fallback>
+            <mc:Fallback xmlns="">
               <p:sp>
                 <p:nvSpPr>
                   <p:cNvPr id="89" name="Rectangle 51"/>
@@ -6295,8 +6291,8 @@
               </p:sp>
             </mc:Fallback>
           </mc:AlternateContent>
-          <mc:AlternateContent xmlns:mc="http://schemas.openxmlformats.org/markup-compatibility/2006">
-            <mc:Choice xmlns:a14="http://schemas.microsoft.com/office/drawing/2010/main" Requires="a14">
+          <mc:AlternateContent xmlns:mc="http://schemas.openxmlformats.org/markup-compatibility/2006" xmlns:a14="http://schemas.microsoft.com/office/drawing/2010/main">
+            <mc:Choice Requires="a14">
               <p:sp>
                 <p:nvSpPr>
                   <p:cNvPr id="90" name="Rectangle 51"/>
@@ -6513,7 +6509,7 @@
                 </p:txBody>
               </p:sp>
             </mc:Choice>
-            <mc:Fallback>
+            <mc:Fallback xmlns="">
               <p:sp>
                 <p:nvSpPr>
                   <p:cNvPr id="90" name="Rectangle 51"/>
@@ -6574,8 +6570,8 @@
               </p:sp>
             </mc:Fallback>
           </mc:AlternateContent>
-          <mc:AlternateContent xmlns:mc="http://schemas.openxmlformats.org/markup-compatibility/2006">
-            <mc:Choice xmlns:a14="http://schemas.microsoft.com/office/drawing/2010/main" Requires="a14">
+          <mc:AlternateContent xmlns:mc="http://schemas.openxmlformats.org/markup-compatibility/2006" xmlns:a14="http://schemas.microsoft.com/office/drawing/2010/main">
+            <mc:Choice Requires="a14">
               <p:sp>
                 <p:nvSpPr>
                   <p:cNvPr id="91" name="Rectangle 51"/>
@@ -6792,7 +6788,7 @@
                 </p:txBody>
               </p:sp>
             </mc:Choice>
-            <mc:Fallback>
+            <mc:Fallback xmlns="">
               <p:sp>
                 <p:nvSpPr>
                   <p:cNvPr id="91" name="Rectangle 51"/>
@@ -6892,8 +6888,8 @@
               </a:prstGeom>
             </p:spPr>
           </p:pic>
-          <mc:AlternateContent xmlns:mc="http://schemas.openxmlformats.org/markup-compatibility/2006">
-            <mc:Choice xmlns:a14="http://schemas.microsoft.com/office/drawing/2010/main" Requires="a14">
+          <mc:AlternateContent xmlns:mc="http://schemas.openxmlformats.org/markup-compatibility/2006" xmlns:a14="http://schemas.microsoft.com/office/drawing/2010/main">
+            <mc:Choice Requires="a14">
               <p:sp>
                 <p:nvSpPr>
                   <p:cNvPr id="93" name="Rectangle 51"/>
@@ -7110,7 +7106,7 @@
                 </p:txBody>
               </p:sp>
             </mc:Choice>
-            <mc:Fallback>
+            <mc:Fallback xmlns="">
               <p:sp>
                 <p:nvSpPr>
                   <p:cNvPr id="93" name="Rectangle 51"/>
@@ -7171,8 +7167,8 @@
               </p:sp>
             </mc:Fallback>
           </mc:AlternateContent>
-          <mc:AlternateContent xmlns:mc="http://schemas.openxmlformats.org/markup-compatibility/2006">
-            <mc:Choice xmlns:a14="http://schemas.microsoft.com/office/drawing/2010/main" Requires="a14">
+          <mc:AlternateContent xmlns:mc="http://schemas.openxmlformats.org/markup-compatibility/2006" xmlns:a14="http://schemas.microsoft.com/office/drawing/2010/main">
+            <mc:Choice Requires="a14">
               <p:sp>
                 <p:nvSpPr>
                   <p:cNvPr id="94" name="Rectangle 51"/>
@@ -7389,7 +7385,7 @@
                 </p:txBody>
               </p:sp>
             </mc:Choice>
-            <mc:Fallback>
+            <mc:Fallback xmlns="">
               <p:sp>
                 <p:nvSpPr>
                   <p:cNvPr id="94" name="Rectangle 51"/>
@@ -7450,8 +7446,8 @@
               </p:sp>
             </mc:Fallback>
           </mc:AlternateContent>
-          <mc:AlternateContent xmlns:mc="http://schemas.openxmlformats.org/markup-compatibility/2006">
-            <mc:Choice xmlns:a14="http://schemas.microsoft.com/office/drawing/2010/main" Requires="a14">
+          <mc:AlternateContent xmlns:mc="http://schemas.openxmlformats.org/markup-compatibility/2006" xmlns:a14="http://schemas.microsoft.com/office/drawing/2010/main">
+            <mc:Choice Requires="a14">
               <p:sp>
                 <p:nvSpPr>
                   <p:cNvPr id="95" name="Rectangle 51"/>
@@ -7668,7 +7664,7 @@
                 </p:txBody>
               </p:sp>
             </mc:Choice>
-            <mc:Fallback>
+            <mc:Fallback xmlns="">
               <p:sp>
                 <p:nvSpPr>
                   <p:cNvPr id="95" name="Rectangle 51"/>
@@ -7768,8 +7764,8 @@
               </a:prstGeom>
             </p:spPr>
           </p:pic>
-          <mc:AlternateContent xmlns:mc="http://schemas.openxmlformats.org/markup-compatibility/2006">
-            <mc:Choice xmlns:a14="http://schemas.microsoft.com/office/drawing/2010/main" Requires="a14">
+          <mc:AlternateContent xmlns:mc="http://schemas.openxmlformats.org/markup-compatibility/2006" xmlns:a14="http://schemas.microsoft.com/office/drawing/2010/main">
+            <mc:Choice Requires="a14">
               <p:sp>
                 <p:nvSpPr>
                   <p:cNvPr id="99" name="Rectangle 51"/>
@@ -7986,7 +7982,7 @@
                 </p:txBody>
               </p:sp>
             </mc:Choice>
-            <mc:Fallback>
+            <mc:Fallback xmlns="">
               <p:sp>
                 <p:nvSpPr>
                   <p:cNvPr id="99" name="Rectangle 51"/>
@@ -8047,8 +8043,8 @@
               </p:sp>
             </mc:Fallback>
           </mc:AlternateContent>
-          <mc:AlternateContent xmlns:mc="http://schemas.openxmlformats.org/markup-compatibility/2006">
-            <mc:Choice xmlns:a14="http://schemas.microsoft.com/office/drawing/2010/main" Requires="a14">
+          <mc:AlternateContent xmlns:mc="http://schemas.openxmlformats.org/markup-compatibility/2006" xmlns:a14="http://schemas.microsoft.com/office/drawing/2010/main">
+            <mc:Choice Requires="a14">
               <p:sp>
                 <p:nvSpPr>
                   <p:cNvPr id="100" name="Rectangle 51"/>
@@ -8265,7 +8261,7 @@
                 </p:txBody>
               </p:sp>
             </mc:Choice>
-            <mc:Fallback>
+            <mc:Fallback xmlns="">
               <p:sp>
                 <p:nvSpPr>
                   <p:cNvPr id="100" name="Rectangle 51"/>
@@ -8326,8 +8322,8 @@
               </p:sp>
             </mc:Fallback>
           </mc:AlternateContent>
-          <mc:AlternateContent xmlns:mc="http://schemas.openxmlformats.org/markup-compatibility/2006">
-            <mc:Choice xmlns:a14="http://schemas.microsoft.com/office/drawing/2010/main" Requires="a14">
+          <mc:AlternateContent xmlns:mc="http://schemas.openxmlformats.org/markup-compatibility/2006" xmlns:a14="http://schemas.microsoft.com/office/drawing/2010/main">
+            <mc:Choice Requires="a14">
               <p:sp>
                 <p:nvSpPr>
                   <p:cNvPr id="101" name="Rectangle 51"/>
@@ -8544,7 +8540,7 @@
                 </p:txBody>
               </p:sp>
             </mc:Choice>
-            <mc:Fallback>
+            <mc:Fallback xmlns="">
               <p:sp>
                 <p:nvSpPr>
                   <p:cNvPr id="101" name="Rectangle 51"/>
@@ -8745,8 +8741,8 @@
             </a:fontRef>
           </p:style>
         </p:cxnSp>
-        <mc:AlternateContent xmlns:mc="http://schemas.openxmlformats.org/markup-compatibility/2006">
-          <mc:Choice xmlns:a14="http://schemas.microsoft.com/office/drawing/2010/main" Requires="a14">
+        <mc:AlternateContent xmlns:mc="http://schemas.openxmlformats.org/markup-compatibility/2006" xmlns:a14="http://schemas.microsoft.com/office/drawing/2010/main">
+          <mc:Choice Requires="a14">
             <p:sp>
               <p:nvSpPr>
                 <p:cNvPr id="119" name="TextBox 118"/>
@@ -8769,6 +8765,7 @@
                 </a:bodyPr>
                 <a:lstStyle/>
                 <a:p>
+                  <a:pPr/>
                   <a14:m>
                     <m:oMathPara xmlns:m="http://schemas.openxmlformats.org/officeDocument/2006/math">
                       <m:oMathParaPr>
@@ -8808,7 +8805,7 @@
               </p:txBody>
             </p:sp>
           </mc:Choice>
-          <mc:Fallback>
+          <mc:Fallback xmlns="">
             <p:sp>
               <p:nvSpPr>
                 <p:cNvPr id="119" name="TextBox 118"/>
@@ -8847,8 +8844,8 @@
             </p:sp>
           </mc:Fallback>
         </mc:AlternateContent>
-        <mc:AlternateContent xmlns:mc="http://schemas.openxmlformats.org/markup-compatibility/2006">
-          <mc:Choice xmlns:a14="http://schemas.microsoft.com/office/drawing/2010/main" Requires="a14">
+        <mc:AlternateContent xmlns:mc="http://schemas.openxmlformats.org/markup-compatibility/2006" xmlns:a14="http://schemas.microsoft.com/office/drawing/2010/main">
+          <mc:Choice Requires="a14">
             <p:sp>
               <p:nvSpPr>
                 <p:cNvPr id="120" name="TextBox 119"/>
@@ -8871,6 +8868,7 @@
                 </a:bodyPr>
                 <a:lstStyle/>
                 <a:p>
+                  <a:pPr/>
                   <a14:m>
                     <m:oMathPara xmlns:m="http://schemas.openxmlformats.org/officeDocument/2006/math">
                       <m:oMathParaPr>
@@ -8918,7 +8916,7 @@
               </p:txBody>
             </p:sp>
           </mc:Choice>
-          <mc:Fallback>
+          <mc:Fallback xmlns="">
             <p:sp>
               <p:nvSpPr>
                 <p:cNvPr id="120" name="TextBox 119"/>
@@ -8957,8 +8955,8 @@
             </p:sp>
           </mc:Fallback>
         </mc:AlternateContent>
-        <mc:AlternateContent xmlns:mc="http://schemas.openxmlformats.org/markup-compatibility/2006">
-          <mc:Choice xmlns:a14="http://schemas.microsoft.com/office/drawing/2010/main" Requires="a14">
+        <mc:AlternateContent xmlns:mc="http://schemas.openxmlformats.org/markup-compatibility/2006" xmlns:a14="http://schemas.microsoft.com/office/drawing/2010/main">
+          <mc:Choice Requires="a14">
             <p:sp>
               <p:nvSpPr>
                 <p:cNvPr id="121" name="TextBox 120"/>
@@ -8981,6 +8979,7 @@
                 </a:bodyPr>
                 <a:lstStyle/>
                 <a:p>
+                  <a:pPr/>
                   <a14:m>
                     <m:oMathPara xmlns:m="http://schemas.openxmlformats.org/officeDocument/2006/math">
                       <m:oMathParaPr>
@@ -9028,7 +9027,7 @@
               </p:txBody>
             </p:sp>
           </mc:Choice>
-          <mc:Fallback>
+          <mc:Fallback xmlns="">
             <p:sp>
               <p:nvSpPr>
                 <p:cNvPr id="121" name="TextBox 120"/>
@@ -9067,8 +9066,8 @@
             </p:sp>
           </mc:Fallback>
         </mc:AlternateContent>
-        <mc:AlternateContent xmlns:mc="http://schemas.openxmlformats.org/markup-compatibility/2006">
-          <mc:Choice xmlns:a14="http://schemas.microsoft.com/office/drawing/2010/main" Requires="a14">
+        <mc:AlternateContent xmlns:mc="http://schemas.openxmlformats.org/markup-compatibility/2006" xmlns:a14="http://schemas.microsoft.com/office/drawing/2010/main">
+          <mc:Choice Requires="a14">
             <p:sp>
               <p:nvSpPr>
                 <p:cNvPr id="122" name="TextBox 121"/>
@@ -9091,6 +9090,7 @@
                 </a:bodyPr>
                 <a:lstStyle/>
                 <a:p>
+                  <a:pPr/>
                   <a14:m>
                     <m:oMathPara xmlns:m="http://schemas.openxmlformats.org/officeDocument/2006/math">
                       <m:oMathParaPr>
@@ -9138,7 +9138,7 @@
               </p:txBody>
             </p:sp>
           </mc:Choice>
-          <mc:Fallback>
+          <mc:Fallback xmlns="">
             <p:sp>
               <p:nvSpPr>
                 <p:cNvPr id="122" name="TextBox 121"/>
@@ -9372,8 +9372,8 @@
             </a:p>
           </p:txBody>
         </p:sp>
-        <mc:AlternateContent xmlns:mc="http://schemas.openxmlformats.org/markup-compatibility/2006">
-          <mc:Choice xmlns:a14="http://schemas.microsoft.com/office/drawing/2010/main" Requires="a14">
+        <mc:AlternateContent xmlns:mc="http://schemas.openxmlformats.org/markup-compatibility/2006" xmlns:a14="http://schemas.microsoft.com/office/drawing/2010/main">
+          <mc:Choice Requires="a14">
             <p:sp>
               <p:nvSpPr>
                 <p:cNvPr id="135" name="TextBox 134"/>
@@ -9396,6 +9396,7 @@
                 </a:bodyPr>
                 <a:lstStyle/>
                 <a:p>
+                  <a:pPr/>
                   <a14:m>
                     <m:oMathPara xmlns:m="http://schemas.openxmlformats.org/officeDocument/2006/math">
                       <m:oMathParaPr>
@@ -9443,7 +9444,7 @@
               </p:txBody>
             </p:sp>
           </mc:Choice>
-          <mc:Fallback>
+          <mc:Fallback xmlns="">
             <p:sp>
               <p:nvSpPr>
                 <p:cNvPr id="135" name="TextBox 134"/>
@@ -9482,8 +9483,8 @@
             </p:sp>
           </mc:Fallback>
         </mc:AlternateContent>
-        <mc:AlternateContent xmlns:mc="http://schemas.openxmlformats.org/markup-compatibility/2006">
-          <mc:Choice xmlns:a14="http://schemas.microsoft.com/office/drawing/2010/main" Requires="a14">
+        <mc:AlternateContent xmlns:mc="http://schemas.openxmlformats.org/markup-compatibility/2006" xmlns:a14="http://schemas.microsoft.com/office/drawing/2010/main">
+          <mc:Choice Requires="a14">
             <p:sp>
               <p:nvSpPr>
                 <p:cNvPr id="136" name="TextBox 135"/>
@@ -9506,6 +9507,7 @@
                 </a:bodyPr>
                 <a:lstStyle/>
                 <a:p>
+                  <a:pPr/>
                   <a14:m>
                     <m:oMathPara xmlns:m="http://schemas.openxmlformats.org/officeDocument/2006/math">
                       <m:oMathParaPr>
@@ -9553,7 +9555,7 @@
               </p:txBody>
             </p:sp>
           </mc:Choice>
-          <mc:Fallback>
+          <mc:Fallback xmlns="">
             <p:sp>
               <p:nvSpPr>
                 <p:cNvPr id="136" name="TextBox 135"/>
@@ -9592,8 +9594,8 @@
             </p:sp>
           </mc:Fallback>
         </mc:AlternateContent>
-        <mc:AlternateContent xmlns:mc="http://schemas.openxmlformats.org/markup-compatibility/2006">
-          <mc:Choice xmlns:a14="http://schemas.microsoft.com/office/drawing/2010/main" Requires="a14">
+        <mc:AlternateContent xmlns:mc="http://schemas.openxmlformats.org/markup-compatibility/2006" xmlns:a14="http://schemas.microsoft.com/office/drawing/2010/main">
+          <mc:Choice Requires="a14">
             <p:sp>
               <p:nvSpPr>
                 <p:cNvPr id="137" name="TextBox 136"/>
@@ -9616,6 +9618,7 @@
                 </a:bodyPr>
                 <a:lstStyle/>
                 <a:p>
+                  <a:pPr/>
                   <a14:m>
                     <m:oMathPara xmlns:m="http://schemas.openxmlformats.org/officeDocument/2006/math">
                       <m:oMathParaPr>
@@ -9663,7 +9666,7 @@
               </p:txBody>
             </p:sp>
           </mc:Choice>
-          <mc:Fallback>
+          <mc:Fallback xmlns="">
             <p:sp>
               <p:nvSpPr>
                 <p:cNvPr id="137" name="TextBox 136"/>
@@ -10726,6 +10729,96 @@
 </p:sld>
 </file>
 
+<file path=ppt/slides/slide4.xml><?xml version="1.0" encoding="utf-8"?>
+<p:sld xmlns:a="http://schemas.openxmlformats.org/drawingml/2006/main" xmlns:r="http://schemas.openxmlformats.org/officeDocument/2006/relationships" xmlns:p="http://schemas.openxmlformats.org/presentationml/2006/main">
+  <p:cSld>
+    <p:spTree>
+      <p:nvGrpSpPr>
+        <p:cNvPr id="1" name=""/>
+        <p:cNvGrpSpPr/>
+        <p:nvPr/>
+      </p:nvGrpSpPr>
+      <p:grpSpPr>
+        <a:xfrm>
+          <a:off x="0" y="0"/>
+          <a:ext cx="0" cy="0"/>
+          <a:chOff x="0" y="0"/>
+          <a:chExt cx="0" cy="0"/>
+        </a:xfrm>
+      </p:grpSpPr>
+      <p:pic>
+        <p:nvPicPr>
+          <p:cNvPr id="4" name="Picture 3"/>
+          <p:cNvPicPr>
+            <a:picLocks noChangeAspect="1"/>
+          </p:cNvPicPr>
+          <p:nvPr/>
+        </p:nvPicPr>
+        <p:blipFill>
+          <a:blip r:embed="rId2">
+            <a:extLst>
+              <a:ext uri="{28A0092B-C50C-407E-A947-70E740481C1C}">
+                <a14:useLocalDpi xmlns:a14="http://schemas.microsoft.com/office/drawing/2010/main" val="0"/>
+              </a:ext>
+            </a:extLst>
+          </a:blip>
+          <a:stretch>
+            <a:fillRect/>
+          </a:stretch>
+        </p:blipFill>
+        <p:spPr>
+          <a:xfrm>
+            <a:off x="212904" y="1562100"/>
+            <a:ext cx="8859659" cy="5695950"/>
+          </a:xfrm>
+          <a:prstGeom prst="rect">
+            <a:avLst/>
+          </a:prstGeom>
+        </p:spPr>
+      </p:pic>
+      <p:pic>
+        <p:nvPicPr>
+          <p:cNvPr id="5" name="Picture 4"/>
+          <p:cNvPicPr>
+            <a:picLocks noChangeAspect="1"/>
+          </p:cNvPicPr>
+          <p:nvPr/>
+        </p:nvPicPr>
+        <p:blipFill>
+          <a:blip r:embed="rId3">
+            <a:extLst>
+              <a:ext uri="{28A0092B-C50C-407E-A947-70E740481C1C}">
+                <a14:useLocalDpi xmlns:a14="http://schemas.microsoft.com/office/drawing/2010/main" val="0"/>
+              </a:ext>
+            </a:extLst>
+          </a:blip>
+          <a:stretch>
+            <a:fillRect/>
+          </a:stretch>
+        </p:blipFill>
+        <p:spPr>
+          <a:xfrm>
+            <a:off x="9072563" y="1562100"/>
+            <a:ext cx="8729662" cy="5722497"/>
+          </a:xfrm>
+          <a:prstGeom prst="rect">
+            <a:avLst/>
+          </a:prstGeom>
+        </p:spPr>
+      </p:pic>
+    </p:spTree>
+    <p:extLst>
+      <p:ext uri="{BB962C8B-B14F-4D97-AF65-F5344CB8AC3E}">
+        <p14:creationId xmlns:p14="http://schemas.microsoft.com/office/powerpoint/2010/main" val="1833167921"/>
+      </p:ext>
+    </p:extLst>
+  </p:cSld>
+  <p:clrMapOvr>
+    <a:masterClrMapping/>
+  </p:clrMapOvr>
+</p:sld>
+</file>
+
 <file path=ppt/theme/theme1.xml><?xml version="1.0" encoding="utf-8"?>
 <a:theme xmlns:a="http://schemas.openxmlformats.org/drawingml/2006/main" name="Office Theme">
   <a:themeElements>

</xml_diff>